<commit_message>
fake someip message run server: ./bin./run_request_sample.sh run_client: python ./doc/example/window/send_unicast.py Server log: UDP: SERVICE: Received message with Client/Session [1314/0001] 00 01 02 03 04 05 09 09 09 09 client log : Response data (hex): 12 34 04 21 00 00 00 12 13 14 00 01 01 00 80 00 09 08 07 06 05 04 03 02 01 00 test: pass
</commit_message>
<xml_diff>
--- a/doc/Vsomeip knowledge.pptx
+++ b/doc/Vsomeip knowledge.pptx
@@ -5,10 +5,10 @@
     <p:sldMasterId id="2147483660" r:id="rId1"/>
   </p:sldMasterIdLst>
   <p:notesMasterIdLst>
-    <p:notesMasterId r:id="rId24"/>
+    <p:notesMasterId r:id="rId27"/>
   </p:notesMasterIdLst>
   <p:handoutMasterIdLst>
-    <p:handoutMasterId r:id="rId25"/>
+    <p:handoutMasterId r:id="rId28"/>
   </p:handoutMasterIdLst>
   <p:sldIdLst>
     <p:sldId id="256" r:id="rId2"/>
@@ -33,6 +33,9 @@
     <p:sldId id="276" r:id="rId21"/>
     <p:sldId id="277" r:id="rId22"/>
     <p:sldId id="278" r:id="rId23"/>
+    <p:sldId id="279" r:id="rId24"/>
+    <p:sldId id="280" r:id="rId25"/>
+    <p:sldId id="281" r:id="rId26"/>
   </p:sldIdLst>
   <p:sldSz cx="9144000" cy="6858000" type="screen4x3"/>
   <p:notesSz cx="6858000" cy="9144000"/>
@@ -344,7 +347,7 @@
           <a:p>
             <a:fld id="{FE167CA5-76A5-4126-94F0-796E0C5E0D54}" type="datetimeFigureOut">
               <a:rPr lang="en-US" smtClean="0"/>
-              <a:t>10/13/2025</a:t>
+              <a:t>10/14/2025</a:t>
             </a:fld>
             <a:endParaRPr lang="en-US"/>
           </a:p>
@@ -510,7 +513,7 @@
           <a:p>
             <a:fld id="{A0BE7B6A-3411-47A0-8068-0F7C7217377E}" type="datetimeFigureOut">
               <a:rPr lang="en-US" smtClean="0"/>
-              <a:t>10/13/2025</a:t>
+              <a:t>10/14/2025</a:t>
             </a:fld>
             <a:endParaRPr lang="en-US"/>
           </a:p>
@@ -3494,8 +3497,83 @@
           <a:p>
             <a:r>
               <a:rPr lang="en-US" dirty="0" smtClean="0"/>
-              <a:t>https://www.iqpc.com/media/9048/29408.pdf</a:t>
-            </a:r>
+              <a:t>https://</a:t>
+            </a:r>
+            <a:r>
+              <a:rPr lang="en-US" dirty="0" smtClean="0"/>
+              <a:t>www.iqpc.com/media/9048/29408.pdf</a:t>
+            </a:r>
+          </a:p>
+          <a:p>
+            <a:endParaRPr lang="en-US" dirty="0" smtClean="0"/>
+          </a:p>
+          <a:p>
+            <a:r>
+              <a:rPr lang="en-US" dirty="0" smtClean="0"/>
+              <a:t>// Difference between attribute and broadcast:</a:t>
+            </a:r>
+          </a:p>
+          <a:p>
+            <a:r>
+              <a:rPr lang="en-US" dirty="0" smtClean="0"/>
+              <a:t>// - attribute: Represents a readable (and optionally writable) property of the interface. Clients can query its current value at any time.</a:t>
+            </a:r>
+          </a:p>
+          <a:p>
+            <a:r>
+              <a:rPr lang="en-US" dirty="0" smtClean="0"/>
+              <a:t>// - broadcast: Represents an event notification. Clients register to receive notifications when the event occurs (e.g., state changes).</a:t>
+            </a:r>
+          </a:p>
+          <a:p>
+            <a:endParaRPr lang="en-US" dirty="0" smtClean="0"/>
+          </a:p>
+          <a:p>
+            <a:r>
+              <a:rPr lang="en-US" dirty="0" smtClean="0"/>
+              <a:t>// For attribute:</a:t>
+            </a:r>
+          </a:p>
+          <a:p>
+            <a:r>
+              <a:rPr lang="en-US" dirty="0" smtClean="0"/>
+              <a:t>// - Clients receive notification only if the attribute is defined as "observable" or "</a:t>
+            </a:r>
+            <a:r>
+              <a:rPr lang="en-US" dirty="0" err="1" smtClean="0"/>
+              <a:t>readonly</a:t>
+            </a:r>
+            <a:r>
+              <a:rPr lang="en-US" dirty="0" smtClean="0"/>
+              <a:t> observable".</a:t>
+            </a:r>
+          </a:p>
+          <a:p>
+            <a:r>
+              <a:rPr lang="en-US" dirty="0" smtClean="0"/>
+              <a:t>// - Notification is sent when the attribute value changes.</a:t>
+            </a:r>
+          </a:p>
+          <a:p>
+            <a:r>
+              <a:rPr lang="en-US" dirty="0" smtClean="0"/>
+              <a:t>// - Notification is also sent immediately when a client first registers for the attribute (initial value).</a:t>
+            </a:r>
+          </a:p>
+          <a:p>
+            <a:r>
+              <a:rPr lang="en-US" dirty="0" smtClean="0"/>
+              <a:t>// - If the attribute is just "</a:t>
+            </a:r>
+            <a:r>
+              <a:rPr lang="en-US" dirty="0" err="1" smtClean="0"/>
+              <a:t>readonly</a:t>
+            </a:r>
+            <a:r>
+              <a:rPr lang="en-US" dirty="0" smtClean="0"/>
+              <a:t>" (not observable), clients must poll to get updates; no automatic notification.</a:t>
+            </a:r>
+            <a:endParaRPr lang="en-US" dirty="0" smtClean="0"/>
           </a:p>
         </p:txBody>
       </p:sp>
@@ -3503,6 +3581,423 @@
     <p:extLst>
       <p:ext uri="{BB962C8B-B14F-4D97-AF65-F5344CB8AC3E}">
         <p14:creationId xmlns:p14="http://schemas.microsoft.com/office/powerpoint/2010/main" val="1541732805"/>
+      </p:ext>
+    </p:extLst>
+  </p:cSld>
+  <p:clrMapOvr>
+    <a:masterClrMapping/>
+  </p:clrMapOvr>
+</p:notes>
+</file>
+
+<file path=ppt/notesSlides/notesSlide23.xml><?xml version="1.0" encoding="utf-8"?>
+<p:notes xmlns:a="http://schemas.openxmlformats.org/drawingml/2006/main" xmlns:r="http://schemas.openxmlformats.org/officeDocument/2006/relationships" xmlns:p="http://schemas.openxmlformats.org/presentationml/2006/main">
+  <p:cSld>
+    <p:spTree>
+      <p:nvGrpSpPr>
+        <p:cNvPr id="1" name=""/>
+        <p:cNvGrpSpPr/>
+        <p:nvPr/>
+      </p:nvGrpSpPr>
+      <p:grpSpPr>
+        <a:xfrm>
+          <a:off x="0" y="0"/>
+          <a:ext cx="0" cy="0"/>
+          <a:chOff x="0" y="0"/>
+          <a:chExt cx="0" cy="0"/>
+        </a:xfrm>
+      </p:grpSpPr>
+      <p:sp>
+        <p:nvSpPr>
+          <p:cNvPr id="2" name="Slide Image Placeholder 1"/>
+          <p:cNvSpPr>
+            <a:spLocks noGrp="1" noRot="1" noChangeAspect="1"/>
+          </p:cNvSpPr>
+          <p:nvPr>
+            <p:ph type="sldImg"/>
+          </p:nvPr>
+        </p:nvSpPr>
+        <p:spPr/>
+      </p:sp>
+      <p:sp>
+        <p:nvSpPr>
+          <p:cNvPr id="3" name="Notes Placeholder 2"/>
+          <p:cNvSpPr>
+            <a:spLocks noGrp="1"/>
+          </p:cNvSpPr>
+          <p:nvPr>
+            <p:ph type="body" idx="1"/>
+          </p:nvPr>
+        </p:nvSpPr>
+        <p:spPr/>
+        <p:txBody>
+          <a:bodyPr/>
+          <a:lstStyle/>
+          <a:p>
+            <a:r>
+              <a:rPr lang="en-US" dirty="0" smtClean="0"/>
+              <a:t>https://</a:t>
+            </a:r>
+            <a:r>
+              <a:rPr lang="en-US" dirty="0" smtClean="0"/>
+              <a:t>www.iqpc.com/media/9048/29408.pdf</a:t>
+            </a:r>
+          </a:p>
+          <a:p>
+            <a:endParaRPr lang="en-US" dirty="0" smtClean="0"/>
+          </a:p>
+          <a:p>
+            <a:r>
+              <a:rPr lang="en-US" dirty="0" smtClean="0"/>
+              <a:t>// Difference between attribute and broadcast:</a:t>
+            </a:r>
+          </a:p>
+          <a:p>
+            <a:r>
+              <a:rPr lang="en-US" dirty="0" smtClean="0"/>
+              <a:t>// - attribute: Represents a readable (and optionally writable) property of the interface. Clients can query its current value at any time.</a:t>
+            </a:r>
+          </a:p>
+          <a:p>
+            <a:r>
+              <a:rPr lang="en-US" dirty="0" smtClean="0"/>
+              <a:t>// - broadcast: Represents an event notification. Clients register to receive notifications when the event occurs (e.g., state changes).</a:t>
+            </a:r>
+          </a:p>
+          <a:p>
+            <a:endParaRPr lang="en-US" dirty="0" smtClean="0"/>
+          </a:p>
+          <a:p>
+            <a:r>
+              <a:rPr lang="en-US" dirty="0" smtClean="0"/>
+              <a:t>// For attribute:</a:t>
+            </a:r>
+          </a:p>
+          <a:p>
+            <a:r>
+              <a:rPr lang="en-US" dirty="0" smtClean="0"/>
+              <a:t>// - Clients receive notification only if the attribute is defined as "observable" or "</a:t>
+            </a:r>
+            <a:r>
+              <a:rPr lang="en-US" dirty="0" err="1" smtClean="0"/>
+              <a:t>readonly</a:t>
+            </a:r>
+            <a:r>
+              <a:rPr lang="en-US" dirty="0" smtClean="0"/>
+              <a:t> observable".</a:t>
+            </a:r>
+          </a:p>
+          <a:p>
+            <a:r>
+              <a:rPr lang="en-US" dirty="0" smtClean="0"/>
+              <a:t>// - Notification is sent when the attribute value changes.</a:t>
+            </a:r>
+          </a:p>
+          <a:p>
+            <a:r>
+              <a:rPr lang="en-US" dirty="0" smtClean="0"/>
+              <a:t>// - Notification is also sent immediately when a client first registers for the attribute (initial value).</a:t>
+            </a:r>
+          </a:p>
+          <a:p>
+            <a:r>
+              <a:rPr lang="en-US" dirty="0" smtClean="0"/>
+              <a:t>// - If the attribute is just "</a:t>
+            </a:r>
+            <a:r>
+              <a:rPr lang="en-US" dirty="0" err="1" smtClean="0"/>
+              <a:t>readonly</a:t>
+            </a:r>
+            <a:r>
+              <a:rPr lang="en-US" dirty="0" smtClean="0"/>
+              <a:t>" (not observable), clients must poll to get updates; no automatic notification.</a:t>
+            </a:r>
+            <a:endParaRPr lang="en-US" dirty="0" smtClean="0"/>
+          </a:p>
+        </p:txBody>
+      </p:sp>
+    </p:spTree>
+    <p:extLst>
+      <p:ext uri="{BB962C8B-B14F-4D97-AF65-F5344CB8AC3E}">
+        <p14:creationId xmlns:p14="http://schemas.microsoft.com/office/powerpoint/2010/main" val="3691545147"/>
+      </p:ext>
+    </p:extLst>
+  </p:cSld>
+  <p:clrMapOvr>
+    <a:masterClrMapping/>
+  </p:clrMapOvr>
+</p:notes>
+</file>
+
+<file path=ppt/notesSlides/notesSlide24.xml><?xml version="1.0" encoding="utf-8"?>
+<p:notes xmlns:a="http://schemas.openxmlformats.org/drawingml/2006/main" xmlns:r="http://schemas.openxmlformats.org/officeDocument/2006/relationships" xmlns:p="http://schemas.openxmlformats.org/presentationml/2006/main">
+  <p:cSld>
+    <p:spTree>
+      <p:nvGrpSpPr>
+        <p:cNvPr id="1" name=""/>
+        <p:cNvGrpSpPr/>
+        <p:nvPr/>
+      </p:nvGrpSpPr>
+      <p:grpSpPr>
+        <a:xfrm>
+          <a:off x="0" y="0"/>
+          <a:ext cx="0" cy="0"/>
+          <a:chOff x="0" y="0"/>
+          <a:chExt cx="0" cy="0"/>
+        </a:xfrm>
+      </p:grpSpPr>
+      <p:sp>
+        <p:nvSpPr>
+          <p:cNvPr id="2" name="Slide Image Placeholder 1"/>
+          <p:cNvSpPr>
+            <a:spLocks noGrp="1" noRot="1" noChangeAspect="1"/>
+          </p:cNvSpPr>
+          <p:nvPr>
+            <p:ph type="sldImg"/>
+          </p:nvPr>
+        </p:nvSpPr>
+        <p:spPr/>
+      </p:sp>
+      <p:sp>
+        <p:nvSpPr>
+          <p:cNvPr id="3" name="Notes Placeholder 2"/>
+          <p:cNvSpPr>
+            <a:spLocks noGrp="1"/>
+          </p:cNvSpPr>
+          <p:nvPr>
+            <p:ph type="body" idx="1"/>
+          </p:nvPr>
+        </p:nvSpPr>
+        <p:spPr/>
+        <p:txBody>
+          <a:bodyPr/>
+          <a:lstStyle/>
+          <a:p>
+            <a:r>
+              <a:rPr lang="en-US" dirty="0" smtClean="0"/>
+              <a:t>https://</a:t>
+            </a:r>
+            <a:r>
+              <a:rPr lang="en-US" dirty="0" smtClean="0"/>
+              <a:t>www.iqpc.com/media/9048/29408.pdf</a:t>
+            </a:r>
+          </a:p>
+          <a:p>
+            <a:endParaRPr lang="en-US" dirty="0" smtClean="0"/>
+          </a:p>
+          <a:p>
+            <a:r>
+              <a:rPr lang="en-US" dirty="0" smtClean="0"/>
+              <a:t>// Difference between attribute and broadcast:</a:t>
+            </a:r>
+          </a:p>
+          <a:p>
+            <a:r>
+              <a:rPr lang="en-US" dirty="0" smtClean="0"/>
+              <a:t>// - attribute: Represents a readable (and optionally writable) property of the interface. Clients can query its current value at any time.</a:t>
+            </a:r>
+          </a:p>
+          <a:p>
+            <a:r>
+              <a:rPr lang="en-US" dirty="0" smtClean="0"/>
+              <a:t>// - broadcast: Represents an event notification. Clients register to receive notifications when the event occurs (e.g., state changes).</a:t>
+            </a:r>
+          </a:p>
+          <a:p>
+            <a:endParaRPr lang="en-US" dirty="0" smtClean="0"/>
+          </a:p>
+          <a:p>
+            <a:r>
+              <a:rPr lang="en-US" dirty="0" smtClean="0"/>
+              <a:t>// For attribute:</a:t>
+            </a:r>
+          </a:p>
+          <a:p>
+            <a:r>
+              <a:rPr lang="en-US" dirty="0" smtClean="0"/>
+              <a:t>// - Clients receive notification only if the attribute is defined as "observable" or "</a:t>
+            </a:r>
+            <a:r>
+              <a:rPr lang="en-US" dirty="0" err="1" smtClean="0"/>
+              <a:t>readonly</a:t>
+            </a:r>
+            <a:r>
+              <a:rPr lang="en-US" dirty="0" smtClean="0"/>
+              <a:t> observable".</a:t>
+            </a:r>
+          </a:p>
+          <a:p>
+            <a:r>
+              <a:rPr lang="en-US" dirty="0" smtClean="0"/>
+              <a:t>// - Notification is sent when the attribute value changes.</a:t>
+            </a:r>
+          </a:p>
+          <a:p>
+            <a:r>
+              <a:rPr lang="en-US" dirty="0" smtClean="0"/>
+              <a:t>// - Notification is also sent immediately when a client first registers for the attribute (initial value).</a:t>
+            </a:r>
+          </a:p>
+          <a:p>
+            <a:r>
+              <a:rPr lang="en-US" dirty="0" smtClean="0"/>
+              <a:t>// - If the attribute is just "</a:t>
+            </a:r>
+            <a:r>
+              <a:rPr lang="en-US" dirty="0" err="1" smtClean="0"/>
+              <a:t>readonly</a:t>
+            </a:r>
+            <a:r>
+              <a:rPr lang="en-US" dirty="0" smtClean="0"/>
+              <a:t>" (not observable), clients must poll to get updates; no automatic notification.</a:t>
+            </a:r>
+            <a:endParaRPr lang="en-US" dirty="0" smtClean="0"/>
+          </a:p>
+        </p:txBody>
+      </p:sp>
+    </p:spTree>
+    <p:extLst>
+      <p:ext uri="{BB962C8B-B14F-4D97-AF65-F5344CB8AC3E}">
+        <p14:creationId xmlns:p14="http://schemas.microsoft.com/office/powerpoint/2010/main" val="2246834535"/>
+      </p:ext>
+    </p:extLst>
+  </p:cSld>
+  <p:clrMapOvr>
+    <a:masterClrMapping/>
+  </p:clrMapOvr>
+</p:notes>
+</file>
+
+<file path=ppt/notesSlides/notesSlide25.xml><?xml version="1.0" encoding="utf-8"?>
+<p:notes xmlns:a="http://schemas.openxmlformats.org/drawingml/2006/main" xmlns:r="http://schemas.openxmlformats.org/officeDocument/2006/relationships" xmlns:p="http://schemas.openxmlformats.org/presentationml/2006/main">
+  <p:cSld>
+    <p:spTree>
+      <p:nvGrpSpPr>
+        <p:cNvPr id="1" name=""/>
+        <p:cNvGrpSpPr/>
+        <p:nvPr/>
+      </p:nvGrpSpPr>
+      <p:grpSpPr>
+        <a:xfrm>
+          <a:off x="0" y="0"/>
+          <a:ext cx="0" cy="0"/>
+          <a:chOff x="0" y="0"/>
+          <a:chExt cx="0" cy="0"/>
+        </a:xfrm>
+      </p:grpSpPr>
+      <p:sp>
+        <p:nvSpPr>
+          <p:cNvPr id="2" name="Slide Image Placeholder 1"/>
+          <p:cNvSpPr>
+            <a:spLocks noGrp="1" noRot="1" noChangeAspect="1"/>
+          </p:cNvSpPr>
+          <p:nvPr>
+            <p:ph type="sldImg"/>
+          </p:nvPr>
+        </p:nvSpPr>
+        <p:spPr/>
+      </p:sp>
+      <p:sp>
+        <p:nvSpPr>
+          <p:cNvPr id="3" name="Notes Placeholder 2"/>
+          <p:cNvSpPr>
+            <a:spLocks noGrp="1"/>
+          </p:cNvSpPr>
+          <p:nvPr>
+            <p:ph type="body" idx="1"/>
+          </p:nvPr>
+        </p:nvSpPr>
+        <p:spPr/>
+        <p:txBody>
+          <a:bodyPr/>
+          <a:lstStyle/>
+          <a:p>
+            <a:r>
+              <a:rPr lang="en-US" dirty="0" smtClean="0"/>
+              <a:t>https://</a:t>
+            </a:r>
+            <a:r>
+              <a:rPr lang="en-US" dirty="0" smtClean="0"/>
+              <a:t>www.iqpc.com/media/9048/29408.pdf</a:t>
+            </a:r>
+          </a:p>
+          <a:p>
+            <a:endParaRPr lang="en-US" dirty="0" smtClean="0"/>
+          </a:p>
+          <a:p>
+            <a:r>
+              <a:rPr lang="en-US" dirty="0" smtClean="0"/>
+              <a:t>// Difference between attribute and broadcast:</a:t>
+            </a:r>
+          </a:p>
+          <a:p>
+            <a:r>
+              <a:rPr lang="en-US" dirty="0" smtClean="0"/>
+              <a:t>// - attribute: Represents a readable (and optionally writable) property of the interface. Clients can query its current value at any time.</a:t>
+            </a:r>
+          </a:p>
+          <a:p>
+            <a:r>
+              <a:rPr lang="en-US" dirty="0" smtClean="0"/>
+              <a:t>// - broadcast: Represents an event notification. Clients register to receive notifications when the event occurs (e.g., state changes).</a:t>
+            </a:r>
+          </a:p>
+          <a:p>
+            <a:endParaRPr lang="en-US" dirty="0" smtClean="0"/>
+          </a:p>
+          <a:p>
+            <a:r>
+              <a:rPr lang="en-US" dirty="0" smtClean="0"/>
+              <a:t>// For attribute:</a:t>
+            </a:r>
+          </a:p>
+          <a:p>
+            <a:r>
+              <a:rPr lang="en-US" dirty="0" smtClean="0"/>
+              <a:t>// - Clients receive notification only if the attribute is defined as "observable" or "</a:t>
+            </a:r>
+            <a:r>
+              <a:rPr lang="en-US" dirty="0" err="1" smtClean="0"/>
+              <a:t>readonly</a:t>
+            </a:r>
+            <a:r>
+              <a:rPr lang="en-US" dirty="0" smtClean="0"/>
+              <a:t> observable".</a:t>
+            </a:r>
+          </a:p>
+          <a:p>
+            <a:r>
+              <a:rPr lang="en-US" dirty="0" smtClean="0"/>
+              <a:t>// - Notification is sent when the attribute value changes.</a:t>
+            </a:r>
+          </a:p>
+          <a:p>
+            <a:r>
+              <a:rPr lang="en-US" dirty="0" smtClean="0"/>
+              <a:t>// - Notification is also sent immediately when a client first registers for the attribute (initial value).</a:t>
+            </a:r>
+          </a:p>
+          <a:p>
+            <a:r>
+              <a:rPr lang="en-US" dirty="0" smtClean="0"/>
+              <a:t>// - If the attribute is just "</a:t>
+            </a:r>
+            <a:r>
+              <a:rPr lang="en-US" dirty="0" err="1" smtClean="0"/>
+              <a:t>readonly</a:t>
+            </a:r>
+            <a:r>
+              <a:rPr lang="en-US" dirty="0" smtClean="0"/>
+              <a:t>" (not observable), clients must poll to get updates; no automatic notification.</a:t>
+            </a:r>
+            <a:endParaRPr lang="en-US" dirty="0" smtClean="0"/>
+          </a:p>
+        </p:txBody>
+      </p:sp>
+    </p:spTree>
+    <p:extLst>
+      <p:ext uri="{BB962C8B-B14F-4D97-AF65-F5344CB8AC3E}">
+        <p14:creationId xmlns:p14="http://schemas.microsoft.com/office/powerpoint/2010/main" val="3582565266"/>
       </p:ext>
     </p:extLst>
   </p:cSld>
@@ -18181,7 +18676,7 @@
         <p:spPr>
           <a:xfrm>
             <a:off x="4214685" y="2463311"/>
-            <a:ext cx="4043799" cy="1600438"/>
+            <a:ext cx="4566532" cy="2031325"/>
           </a:xfrm>
           <a:prstGeom prst="rect">
             <a:avLst/>
@@ -18193,7 +18688,7 @@
           </a:solidFill>
         </p:spPr>
         <p:txBody>
-          <a:bodyPr wrap="none" rtlCol="0">
+          <a:bodyPr wrap="square" rtlCol="0">
             <a:spAutoFit/>
           </a:bodyPr>
           <a:lstStyle/>
@@ -18218,8 +18713,35 @@
           <a:p>
             <a:r>
               <a:rPr lang="en-US" sz="1400" i="1" dirty="0" smtClean="0"/>
-              <a:t>Int32_t sum = 0;</a:t>
-            </a:r>
+              <a:t>Int32_t sum = 0</a:t>
+            </a:r>
+            <a:r>
+              <a:rPr lang="en-US" sz="1400" i="1" dirty="0" smtClean="0"/>
+              <a:t>;</a:t>
+            </a:r>
+          </a:p>
+          <a:p>
+            <a:r>
+              <a:rPr lang="en-US" sz="1400" i="1" dirty="0" err="1"/>
+              <a:t>CommonAPI</a:t>
+            </a:r>
+            <a:r>
+              <a:rPr lang="en-US" sz="1400" i="1" dirty="0"/>
+              <a:t>::</a:t>
+            </a:r>
+            <a:r>
+              <a:rPr lang="en-US" sz="1400" i="1" dirty="0" err="1"/>
+              <a:t>CallInfo</a:t>
+            </a:r>
+            <a:r>
+              <a:rPr lang="en-US" sz="1400" i="1" dirty="0"/>
+              <a:t> </a:t>
+            </a:r>
+            <a:r>
+              <a:rPr lang="en-US" sz="1400" i="1" dirty="0" smtClean="0"/>
+              <a:t>info(3000ms); //timeout default = 5s</a:t>
+            </a:r>
+            <a:endParaRPr lang="en-US" sz="1400" i="1" dirty="0"/>
           </a:p>
           <a:p>
             <a:r>
@@ -18307,6 +18829,44 @@
             <a:endParaRPr lang="en-US" sz="1400" i="1" dirty="0"/>
           </a:p>
           <a:p>
+            <a:r>
+              <a:rPr lang="en-US" sz="1400" i="1" dirty="0" smtClean="0"/>
+              <a:t>// </a:t>
+            </a:r>
+            <a:r>
+              <a:rPr lang="en-US" sz="1400" i="1" dirty="0" err="1" smtClean="0"/>
+              <a:t>async</a:t>
+            </a:r>
+            <a:r>
+              <a:rPr lang="en-US" sz="1400" i="1" dirty="0" smtClean="0"/>
+              <a:t> call</a:t>
+            </a:r>
+          </a:p>
+          <a:p>
+            <a:r>
+              <a:rPr lang="en-US" sz="1400" i="1" dirty="0" err="1"/>
+              <a:t>myProxy</a:t>
+            </a:r>
+            <a:r>
+              <a:rPr lang="en-US" sz="1400" i="1" dirty="0"/>
+              <a:t>-&gt;</a:t>
+            </a:r>
+            <a:r>
+              <a:rPr lang="en-US" sz="1400" i="1" dirty="0" err="1"/>
+              <a:t>calculateSum</a:t>
+            </a:r>
+            <a:r>
+              <a:rPr lang="en-US" sz="1400" dirty="0" err="1"/>
+              <a:t>Async</a:t>
+            </a:r>
+            <a:r>
+              <a:rPr lang="en-US" sz="1400" i="1" dirty="0"/>
+              <a:t>(a, b, callback, &amp;info</a:t>
+            </a:r>
+            <a:r>
+              <a:rPr lang="en-US" sz="1400" i="1" dirty="0" smtClean="0"/>
+              <a:t>);</a:t>
+            </a:r>
             <a:endParaRPr lang="en-US" sz="1400" i="1" dirty="0"/>
           </a:p>
         </p:txBody>
@@ -18319,7 +18879,7 @@
         </p:nvSpPr>
         <p:spPr>
           <a:xfrm>
-            <a:off x="4216100" y="4411745"/>
+            <a:off x="4214685" y="4674232"/>
             <a:ext cx="4221540" cy="1815882"/>
           </a:xfrm>
           <a:prstGeom prst="rect">
@@ -20694,7 +21254,7 @@
         <p:spPr>
           <a:xfrm>
             <a:off x="646545" y="1318053"/>
-            <a:ext cx="4350037" cy="1384995"/>
+            <a:ext cx="8429808" cy="1384995"/>
           </a:xfrm>
           <a:prstGeom prst="rect">
             <a:avLst/>
@@ -20771,13 +21331,78 @@
               <a:rPr lang="en-US" sz="1400" dirty="0"/>
               <a:t> (sends out Events with new values on </a:t>
             </a:r>
-          </a:p>
-          <a:p>
+            <a:r>
+              <a:rPr lang="en-US" sz="1400" dirty="0" smtClean="0"/>
+              <a:t>change </a:t>
+            </a:r>
             <a:r>
               <a:rPr lang="en-US" sz="1400" dirty="0"/>
-              <a:t>change of field value).</a:t>
-            </a:r>
-            <a:endParaRPr lang="en-US" sz="1400" i="1" dirty="0"/>
+              <a:t>of field </a:t>
+            </a:r>
+            <a:r>
+              <a:rPr lang="en-US" sz="1400" dirty="0"/>
+              <a:t>value, </a:t>
+            </a:r>
+            <a:r>
+              <a:rPr lang="en-US" sz="1400" dirty="0" smtClean="0">
+                <a:solidFill>
+                  <a:schemeClr val="accent2"/>
+                </a:solidFill>
+              </a:rPr>
+              <a:t>notification </a:t>
+            </a:r>
+            <a:r>
+              <a:rPr lang="en-US" sz="1400" dirty="0">
+                <a:solidFill>
+                  <a:schemeClr val="accent2"/>
+                </a:solidFill>
+              </a:rPr>
+              <a:t>is also sent immediately </a:t>
+            </a:r>
+            <a:endParaRPr lang="en-US" sz="1400" dirty="0" smtClean="0">
+              <a:solidFill>
+                <a:schemeClr val="accent2"/>
+              </a:solidFill>
+            </a:endParaRPr>
+          </a:p>
+          <a:p>
+            <a:r>
+              <a:rPr lang="en-US" sz="1400" dirty="0" smtClean="0">
+                <a:solidFill>
+                  <a:schemeClr val="accent2"/>
+                </a:solidFill>
+              </a:rPr>
+              <a:t>when a </a:t>
+            </a:r>
+            <a:r>
+              <a:rPr lang="en-US" sz="1400" dirty="0">
+                <a:solidFill>
+                  <a:schemeClr val="accent2"/>
+                </a:solidFill>
+              </a:rPr>
+              <a:t>client first registers for the attribute (initial value</a:t>
+            </a:r>
+            <a:r>
+              <a:rPr lang="en-US" sz="1400" dirty="0" smtClean="0">
+                <a:solidFill>
+                  <a:schemeClr val="accent2"/>
+                </a:solidFill>
+              </a:rPr>
+              <a:t>)</a:t>
+            </a:r>
+            <a:r>
+              <a:rPr lang="en-US" sz="1400" dirty="0" smtClean="0">
+                <a:solidFill>
+                  <a:schemeClr val="accent2"/>
+                </a:solidFill>
+              </a:rPr>
+              <a:t>).</a:t>
+            </a:r>
+            <a:endParaRPr lang="en-US" sz="1400" i="1" dirty="0">
+              <a:solidFill>
+                <a:schemeClr val="accent2"/>
+              </a:solidFill>
+            </a:endParaRPr>
           </a:p>
         </p:txBody>
       </p:sp>
@@ -20975,7 +21600,7 @@
         <p:spPr>
           <a:xfrm>
             <a:off x="4152697" y="2784926"/>
-            <a:ext cx="4904099" cy="2154436"/>
+            <a:ext cx="4904099" cy="2123658"/>
           </a:xfrm>
           <a:prstGeom prst="rect">
             <a:avLst/>
@@ -21115,7 +21740,11 @@
           <a:p>
             <a:r>
               <a:rPr lang="en-US" sz="1200" i="1" dirty="0" smtClean="0"/>
-              <a:t>//Subscribe</a:t>
+              <a:t>//</a:t>
+            </a:r>
+            <a:r>
+              <a:rPr lang="en-US" sz="1200" i="1" dirty="0" smtClean="0"/>
+              <a:t>Subscribe</a:t>
             </a:r>
           </a:p>
           <a:p>
@@ -21623,6 +22252,1343 @@
     <p:extLst>
       <p:ext uri="{BB962C8B-B14F-4D97-AF65-F5344CB8AC3E}">
         <p14:creationId xmlns:p14="http://schemas.microsoft.com/office/powerpoint/2010/main" val="2670480877"/>
+      </p:ext>
+    </p:extLst>
+  </p:cSld>
+  <p:clrMapOvr>
+    <a:masterClrMapping/>
+  </p:clrMapOvr>
+  <p:timing>
+    <p:tnLst>
+      <p:par>
+        <p:cTn id="1" dur="indefinite" restart="never" nodeType="tmRoot"/>
+      </p:par>
+    </p:tnLst>
+  </p:timing>
+</p:sld>
+</file>
+
+<file path=ppt/slides/slide23.xml><?xml version="1.0" encoding="utf-8"?>
+<p:sld xmlns:a="http://schemas.openxmlformats.org/drawingml/2006/main" xmlns:r="http://schemas.openxmlformats.org/officeDocument/2006/relationships" xmlns:p="http://schemas.openxmlformats.org/presentationml/2006/main">
+  <p:cSld>
+    <p:spTree>
+      <p:nvGrpSpPr>
+        <p:cNvPr id="1" name=""/>
+        <p:cNvGrpSpPr/>
+        <p:nvPr/>
+      </p:nvGrpSpPr>
+      <p:grpSpPr>
+        <a:xfrm>
+          <a:off x="0" y="0"/>
+          <a:ext cx="0" cy="0"/>
+          <a:chOff x="0" y="0"/>
+          <a:chExt cx="0" cy="0"/>
+        </a:xfrm>
+      </p:grpSpPr>
+      <p:sp>
+        <p:nvSpPr>
+          <p:cNvPr id="3" name="Content Placeholder 2"/>
+          <p:cNvSpPr>
+            <a:spLocks noGrp="1"/>
+          </p:cNvSpPr>
+          <p:nvPr>
+            <p:ph idx="1"/>
+          </p:nvPr>
+        </p:nvSpPr>
+        <p:spPr>
+          <a:xfrm>
+            <a:off x="347330" y="467833"/>
+            <a:ext cx="8168020" cy="5709130"/>
+          </a:xfrm>
+        </p:spPr>
+        <p:txBody>
+          <a:bodyPr/>
+          <a:lstStyle/>
+          <a:p>
+            <a:pPr marL="0" indent="0">
+              <a:buNone/>
+            </a:pPr>
+            <a:r>
+              <a:rPr lang="en-US" sz="2400" b="1" dirty="0"/>
+              <a:t>4</a:t>
+            </a:r>
+            <a:r>
+              <a:rPr lang="en-US" sz="2400" b="1" dirty="0" smtClean="0"/>
+              <a:t>. Demo </a:t>
+            </a:r>
+            <a:r>
+              <a:rPr lang="en-US" sz="1400" dirty="0"/>
+              <a:t>(https://github.com/minhthedt/vsomeip-example)</a:t>
+            </a:r>
+            <a:endParaRPr lang="en-US" sz="1400" b="1" dirty="0" smtClean="0"/>
+          </a:p>
+        </p:txBody>
+      </p:sp>
+      <p:sp>
+        <p:nvSpPr>
+          <p:cNvPr id="9" name="Slide Number Placeholder 8"/>
+          <p:cNvSpPr>
+            <a:spLocks noGrp="1"/>
+          </p:cNvSpPr>
+          <p:nvPr>
+            <p:ph type="sldNum" sz="quarter" idx="12"/>
+          </p:nvPr>
+        </p:nvSpPr>
+        <p:spPr>
+          <a:xfrm>
+            <a:off x="8744270" y="6492875"/>
+            <a:ext cx="2057400" cy="365125"/>
+          </a:xfrm>
+        </p:spPr>
+        <p:txBody>
+          <a:bodyPr/>
+          <a:lstStyle/>
+          <a:p>
+            <a:fld id="{96C55251-E90D-44CC-8B75-53FCEE02E655}" type="slidenum">
+              <a:rPr lang="en-US" smtClean="0">
+                <a:solidFill>
+                  <a:schemeClr val="bg1">
+                    <a:lumMod val="50000"/>
+                  </a:schemeClr>
+                </a:solidFill>
+              </a:rPr>
+              <a:t>23</a:t>
+            </a:fld>
+            <a:endParaRPr lang="en-US" dirty="0">
+              <a:solidFill>
+                <a:schemeClr val="bg1">
+                  <a:lumMod val="50000"/>
+                </a:schemeClr>
+              </a:solidFill>
+            </a:endParaRPr>
+          </a:p>
+        </p:txBody>
+      </p:sp>
+      <p:sp>
+        <p:nvSpPr>
+          <p:cNvPr id="4" name="TextBox 3"/>
+          <p:cNvSpPr txBox="1"/>
+          <p:nvPr/>
+        </p:nvSpPr>
+        <p:spPr>
+          <a:xfrm>
+            <a:off x="550489" y="1256716"/>
+            <a:ext cx="4666534" cy="3754874"/>
+          </a:xfrm>
+          <a:prstGeom prst="rect">
+            <a:avLst/>
+          </a:prstGeom>
+          <a:solidFill>
+            <a:schemeClr val="bg1">
+              <a:lumMod val="95000"/>
+            </a:schemeClr>
+          </a:solidFill>
+        </p:spPr>
+        <p:txBody>
+          <a:bodyPr wrap="none" rtlCol="0">
+            <a:spAutoFit/>
+          </a:bodyPr>
+          <a:lstStyle/>
+          <a:p>
+            <a:r>
+              <a:rPr lang="en-US" sz="1400" b="1" dirty="0" smtClean="0"/>
+              <a:t>Environment: </a:t>
+            </a:r>
+            <a:r>
+              <a:rPr lang="en-US" sz="1400" b="1" dirty="0"/>
+              <a:t>Ubuntu </a:t>
+            </a:r>
+            <a:r>
+              <a:rPr lang="en-US" sz="1400" b="1" dirty="0" smtClean="0"/>
+              <a:t>18.04 and higher</a:t>
+            </a:r>
+          </a:p>
+          <a:p>
+            <a:endParaRPr lang="en-US" sz="1400" b="1" dirty="0" smtClean="0"/>
+          </a:p>
+          <a:p>
+            <a:r>
+              <a:rPr lang="en-US" sz="1400" b="1" dirty="0" smtClean="0"/>
+              <a:t>1) Download </a:t>
+            </a:r>
+            <a:r>
+              <a:rPr lang="en-US" sz="1400" b="1" dirty="0" err="1" smtClean="0"/>
+              <a:t>vsomeip</a:t>
+            </a:r>
+            <a:r>
+              <a:rPr lang="en-US" sz="1400" b="1" dirty="0" smtClean="0"/>
+              <a:t>-example</a:t>
+            </a:r>
+          </a:p>
+          <a:p>
+            <a:r>
+              <a:rPr lang="en-US" sz="1400" b="1" dirty="0" smtClean="0"/>
+              <a:t># </a:t>
+            </a:r>
+            <a:r>
+              <a:rPr lang="en-US" sz="1400" b="1" dirty="0"/>
+              <a:t>Install essential tools</a:t>
+            </a:r>
+          </a:p>
+          <a:p>
+            <a:r>
+              <a:rPr lang="en-US" sz="1400" dirty="0" err="1"/>
+              <a:t>sudo</a:t>
+            </a:r>
+            <a:r>
+              <a:rPr lang="en-US" sz="1400" dirty="0"/>
+              <a:t> apt update</a:t>
+            </a:r>
+          </a:p>
+          <a:p>
+            <a:r>
+              <a:rPr lang="en-US" sz="1400" dirty="0" err="1"/>
+              <a:t>sudo</a:t>
+            </a:r>
+            <a:r>
+              <a:rPr lang="en-US" sz="1400" dirty="0"/>
+              <a:t> apt install -y </a:t>
+            </a:r>
+            <a:r>
+              <a:rPr lang="en-US" sz="1400" dirty="0" err="1"/>
+              <a:t>openssh</a:t>
+            </a:r>
+            <a:r>
+              <a:rPr lang="en-US" sz="1400" dirty="0"/>
+              <a:t>-server screen </a:t>
+            </a:r>
+            <a:r>
+              <a:rPr lang="en-US" sz="1400" dirty="0" err="1"/>
+              <a:t>git</a:t>
+            </a:r>
+            <a:endParaRPr lang="en-US" sz="1400" dirty="0"/>
+          </a:p>
+          <a:p>
+            <a:r>
+              <a:rPr lang="en-US" sz="1400" dirty="0" err="1"/>
+              <a:t>sudo</a:t>
+            </a:r>
+            <a:r>
+              <a:rPr lang="en-US" sz="1400" dirty="0"/>
+              <a:t> apt install -y net-tools </a:t>
+            </a:r>
+            <a:r>
+              <a:rPr lang="en-US" sz="1400" dirty="0" err="1"/>
+              <a:t>netcat</a:t>
+            </a:r>
+            <a:r>
+              <a:rPr lang="en-US" sz="1400" dirty="0"/>
+              <a:t> </a:t>
+            </a:r>
+            <a:r>
+              <a:rPr lang="en-US" sz="1400" dirty="0" err="1"/>
+              <a:t>socat</a:t>
+            </a:r>
+            <a:r>
+              <a:rPr lang="en-US" sz="1400" dirty="0"/>
+              <a:t> </a:t>
+            </a:r>
+            <a:r>
+              <a:rPr lang="en-US" sz="1400" dirty="0" err="1"/>
+              <a:t>tcpdump</a:t>
+            </a:r>
+            <a:endParaRPr lang="en-US" sz="1400" dirty="0"/>
+          </a:p>
+          <a:p>
+            <a:endParaRPr lang="en-US" sz="1400" dirty="0"/>
+          </a:p>
+          <a:p>
+            <a:r>
+              <a:rPr lang="en-US" sz="1400" b="1" dirty="0"/>
+              <a:t># Clone example and install dependencies</a:t>
+            </a:r>
+          </a:p>
+          <a:p>
+            <a:r>
+              <a:rPr lang="en-US" sz="1400" dirty="0" err="1"/>
+              <a:t>git</a:t>
+            </a:r>
+            <a:r>
+              <a:rPr lang="en-US" sz="1400" dirty="0"/>
+              <a:t> clone https://github.com/minhthedt/vsomeip-example.git</a:t>
+            </a:r>
+          </a:p>
+          <a:p>
+            <a:r>
+              <a:rPr lang="en-US" sz="1400" dirty="0"/>
+              <a:t>cd </a:t>
+            </a:r>
+            <a:r>
+              <a:rPr lang="en-US" sz="1400" dirty="0" err="1"/>
+              <a:t>vsomeip</a:t>
+            </a:r>
+            <a:r>
+              <a:rPr lang="en-US" sz="1400" dirty="0"/>
+              <a:t>-example</a:t>
+            </a:r>
+          </a:p>
+          <a:p>
+            <a:r>
+              <a:rPr lang="en-US" sz="1400" dirty="0" err="1"/>
+              <a:t>sudo</a:t>
+            </a:r>
+            <a:r>
+              <a:rPr lang="en-US" sz="1400" dirty="0"/>
+              <a:t> ./set_env.sh 2&gt;&amp;1 | tee </a:t>
+            </a:r>
+            <a:r>
+              <a:rPr lang="en-US" sz="1400" dirty="0" smtClean="0"/>
+              <a:t>log.txt</a:t>
+            </a:r>
+          </a:p>
+          <a:p>
+            <a:endParaRPr lang="en-US" sz="1400" dirty="0" smtClean="0"/>
+          </a:p>
+          <a:p>
+            <a:r>
+              <a:rPr lang="en-US" sz="1400" b="1" dirty="0" smtClean="0"/>
+              <a:t>2) Build </a:t>
+            </a:r>
+            <a:r>
+              <a:rPr lang="en-US" sz="1400" b="1" dirty="0" err="1"/>
+              <a:t>vsomeip</a:t>
+            </a:r>
+            <a:r>
+              <a:rPr lang="en-US" sz="1400" b="1" dirty="0"/>
+              <a:t>-example</a:t>
+            </a:r>
+            <a:endParaRPr lang="en-US" sz="1400" dirty="0"/>
+          </a:p>
+          <a:p>
+            <a:r>
+              <a:rPr lang="en-US" sz="1400" dirty="0"/>
+              <a:t>cd </a:t>
+            </a:r>
+            <a:r>
+              <a:rPr lang="en-US" sz="1400" dirty="0" err="1"/>
+              <a:t>vsomeip</a:t>
+            </a:r>
+            <a:r>
+              <a:rPr lang="en-US" sz="1400" dirty="0"/>
+              <a:t>-example</a:t>
+            </a:r>
+          </a:p>
+          <a:p>
+            <a:r>
+              <a:rPr lang="en-US" sz="1400" dirty="0" err="1"/>
+              <a:t>sudo</a:t>
+            </a:r>
+            <a:r>
+              <a:rPr lang="en-US" sz="1400" dirty="0"/>
+              <a:t> ./build.sh</a:t>
+            </a:r>
+          </a:p>
+          <a:p>
+            <a:r>
+              <a:rPr lang="en-US" sz="1400" dirty="0"/>
+              <a:t># Output: ./</a:t>
+            </a:r>
+            <a:r>
+              <a:rPr lang="en-US" sz="1400" dirty="0" err="1"/>
+              <a:t>vsomeip</a:t>
+            </a:r>
+            <a:r>
+              <a:rPr lang="en-US" sz="1400" dirty="0"/>
+              <a:t>-example/bin</a:t>
+            </a:r>
+            <a:r>
+              <a:rPr lang="en-US" sz="1400" dirty="0" smtClean="0"/>
+              <a:t>/...</a:t>
+            </a:r>
+            <a:endParaRPr lang="en-US" sz="1400" dirty="0"/>
+          </a:p>
+        </p:txBody>
+      </p:sp>
+      <p:pic>
+        <p:nvPicPr>
+          <p:cNvPr id="13" name="Picture 12"/>
+          <p:cNvPicPr>
+            <a:picLocks noChangeAspect="1"/>
+          </p:cNvPicPr>
+          <p:nvPr/>
+        </p:nvPicPr>
+        <p:blipFill>
+          <a:blip r:embed="rId3"/>
+          <a:stretch>
+            <a:fillRect/>
+          </a:stretch>
+        </p:blipFill>
+        <p:spPr>
+          <a:xfrm>
+            <a:off x="6133967" y="990208"/>
+            <a:ext cx="1986775" cy="5867792"/>
+          </a:xfrm>
+          <a:prstGeom prst="rect">
+            <a:avLst/>
+          </a:prstGeom>
+        </p:spPr>
+      </p:pic>
+      <p:sp>
+        <p:nvSpPr>
+          <p:cNvPr id="18" name="TextBox 17"/>
+          <p:cNvSpPr txBox="1"/>
+          <p:nvPr/>
+        </p:nvSpPr>
+        <p:spPr>
+          <a:xfrm>
+            <a:off x="550489" y="887384"/>
+            <a:ext cx="1013804" cy="369332"/>
+          </a:xfrm>
+          <a:prstGeom prst="rect">
+            <a:avLst/>
+          </a:prstGeom>
+          <a:noFill/>
+        </p:spPr>
+        <p:txBody>
+          <a:bodyPr wrap="none" rtlCol="0">
+            <a:spAutoFit/>
+          </a:bodyPr>
+          <a:lstStyle/>
+          <a:p>
+            <a:pPr marL="285750" indent="-285750">
+              <a:buFont typeface="Wingdings" panose="05000000000000000000" pitchFamily="2" charset="2"/>
+              <a:buChar char="Ø"/>
+            </a:pPr>
+            <a:r>
+              <a:rPr lang="en-US" b="1" dirty="0" smtClean="0"/>
+              <a:t>Setup</a:t>
+            </a:r>
+            <a:endParaRPr lang="en-US" b="1" dirty="0"/>
+          </a:p>
+        </p:txBody>
+      </p:sp>
+    </p:spTree>
+    <p:extLst>
+      <p:ext uri="{BB962C8B-B14F-4D97-AF65-F5344CB8AC3E}">
+        <p14:creationId xmlns:p14="http://schemas.microsoft.com/office/powerpoint/2010/main" val="1419911163"/>
+      </p:ext>
+    </p:extLst>
+  </p:cSld>
+  <p:clrMapOvr>
+    <a:masterClrMapping/>
+  </p:clrMapOvr>
+  <p:timing>
+    <p:tnLst>
+      <p:par>
+        <p:cTn id="1" dur="indefinite" restart="never" nodeType="tmRoot"/>
+      </p:par>
+    </p:tnLst>
+  </p:timing>
+</p:sld>
+</file>
+
+<file path=ppt/slides/slide24.xml><?xml version="1.0" encoding="utf-8"?>
+<p:sld xmlns:a="http://schemas.openxmlformats.org/drawingml/2006/main" xmlns:r="http://schemas.openxmlformats.org/officeDocument/2006/relationships" xmlns:p="http://schemas.openxmlformats.org/presentationml/2006/main">
+  <p:cSld>
+    <p:spTree>
+      <p:nvGrpSpPr>
+        <p:cNvPr id="1" name=""/>
+        <p:cNvGrpSpPr/>
+        <p:nvPr/>
+      </p:nvGrpSpPr>
+      <p:grpSpPr>
+        <a:xfrm>
+          <a:off x="0" y="0"/>
+          <a:ext cx="0" cy="0"/>
+          <a:chOff x="0" y="0"/>
+          <a:chExt cx="0" cy="0"/>
+        </a:xfrm>
+      </p:grpSpPr>
+      <p:sp>
+        <p:nvSpPr>
+          <p:cNvPr id="3" name="Content Placeholder 2"/>
+          <p:cNvSpPr>
+            <a:spLocks noGrp="1"/>
+          </p:cNvSpPr>
+          <p:nvPr>
+            <p:ph idx="1"/>
+          </p:nvPr>
+        </p:nvSpPr>
+        <p:spPr>
+          <a:xfrm>
+            <a:off x="347330" y="467833"/>
+            <a:ext cx="8168020" cy="5709130"/>
+          </a:xfrm>
+        </p:spPr>
+        <p:txBody>
+          <a:bodyPr/>
+          <a:lstStyle/>
+          <a:p>
+            <a:pPr marL="0" indent="0">
+              <a:buNone/>
+            </a:pPr>
+            <a:r>
+              <a:rPr lang="en-US" sz="2400" b="1" dirty="0"/>
+              <a:t>4</a:t>
+            </a:r>
+            <a:r>
+              <a:rPr lang="en-US" sz="2400" b="1" dirty="0" smtClean="0"/>
+              <a:t>. Demo </a:t>
+            </a:r>
+            <a:r>
+              <a:rPr lang="en-US" sz="1400" dirty="0"/>
+              <a:t>(https://github.com/minhthedt/vsomeip-example)</a:t>
+            </a:r>
+            <a:endParaRPr lang="en-US" sz="1400" b="1" dirty="0" smtClean="0"/>
+          </a:p>
+        </p:txBody>
+      </p:sp>
+      <p:sp>
+        <p:nvSpPr>
+          <p:cNvPr id="9" name="Slide Number Placeholder 8"/>
+          <p:cNvSpPr>
+            <a:spLocks noGrp="1"/>
+          </p:cNvSpPr>
+          <p:nvPr>
+            <p:ph type="sldNum" sz="quarter" idx="12"/>
+          </p:nvPr>
+        </p:nvSpPr>
+        <p:spPr>
+          <a:xfrm>
+            <a:off x="8744270" y="6492875"/>
+            <a:ext cx="2057400" cy="365125"/>
+          </a:xfrm>
+        </p:spPr>
+        <p:txBody>
+          <a:bodyPr/>
+          <a:lstStyle/>
+          <a:p>
+            <a:fld id="{96C55251-E90D-44CC-8B75-53FCEE02E655}" type="slidenum">
+              <a:rPr lang="en-US" smtClean="0">
+                <a:solidFill>
+                  <a:schemeClr val="bg1">
+                    <a:lumMod val="50000"/>
+                  </a:schemeClr>
+                </a:solidFill>
+              </a:rPr>
+              <a:t>24</a:t>
+            </a:fld>
+            <a:endParaRPr lang="en-US" dirty="0">
+              <a:solidFill>
+                <a:schemeClr val="bg1">
+                  <a:lumMod val="50000"/>
+                </a:schemeClr>
+              </a:solidFill>
+            </a:endParaRPr>
+          </a:p>
+        </p:txBody>
+      </p:sp>
+      <p:sp>
+        <p:nvSpPr>
+          <p:cNvPr id="2" name="TextBox 1"/>
+          <p:cNvSpPr txBox="1"/>
+          <p:nvPr/>
+        </p:nvSpPr>
+        <p:spPr>
+          <a:xfrm>
+            <a:off x="527957" y="922173"/>
+            <a:ext cx="6307881" cy="369332"/>
+          </a:xfrm>
+          <a:prstGeom prst="rect">
+            <a:avLst/>
+          </a:prstGeom>
+          <a:noFill/>
+        </p:spPr>
+        <p:txBody>
+          <a:bodyPr wrap="none" rtlCol="0">
+            <a:spAutoFit/>
+          </a:bodyPr>
+          <a:lstStyle/>
+          <a:p>
+            <a:pPr marL="285750" indent="-285750">
+              <a:buFont typeface="Wingdings" panose="05000000000000000000" pitchFamily="2" charset="2"/>
+              <a:buChar char="Ø"/>
+            </a:pPr>
+            <a:r>
+              <a:rPr lang="en-US" dirty="0">
+                <a:solidFill>
+                  <a:srgbClr val="FF0000"/>
+                </a:solidFill>
+              </a:rPr>
+              <a:t>Make sure both PCs can send/receive multicast before testing.</a:t>
+            </a:r>
+            <a:endParaRPr lang="en-US" dirty="0">
+              <a:solidFill>
+                <a:srgbClr val="FF0000"/>
+              </a:solidFill>
+            </a:endParaRPr>
+          </a:p>
+        </p:txBody>
+      </p:sp>
+      <p:sp>
+        <p:nvSpPr>
+          <p:cNvPr id="5" name="TextBox 4"/>
+          <p:cNvSpPr txBox="1"/>
+          <p:nvPr/>
+        </p:nvSpPr>
+        <p:spPr>
+          <a:xfrm>
+            <a:off x="527957" y="1370511"/>
+            <a:ext cx="4637039" cy="1600438"/>
+          </a:xfrm>
+          <a:prstGeom prst="rect">
+            <a:avLst/>
+          </a:prstGeom>
+          <a:solidFill>
+            <a:schemeClr val="bg1">
+              <a:lumMod val="95000"/>
+            </a:schemeClr>
+          </a:solidFill>
+        </p:spPr>
+        <p:txBody>
+          <a:bodyPr wrap="none" rtlCol="0">
+            <a:spAutoFit/>
+          </a:bodyPr>
+          <a:lstStyle/>
+          <a:p>
+            <a:r>
+              <a:rPr lang="en-US" sz="1400" b="1" dirty="0"/>
+              <a:t># (Optional) Route all multicast traffic (224.0.0.0/4) via eth0</a:t>
+            </a:r>
+          </a:p>
+          <a:p>
+            <a:r>
+              <a:rPr lang="en-US" sz="1400" dirty="0" err="1"/>
+              <a:t>ifconfig</a:t>
+            </a:r>
+            <a:endParaRPr lang="en-US" sz="1400" dirty="0"/>
+          </a:p>
+          <a:p>
+            <a:r>
+              <a:rPr lang="en-US" sz="1400" dirty="0" err="1"/>
+              <a:t>sudo</a:t>
+            </a:r>
+            <a:r>
+              <a:rPr lang="en-US" sz="1400" dirty="0"/>
+              <a:t> </a:t>
+            </a:r>
+            <a:r>
+              <a:rPr lang="en-US" sz="1400" dirty="0" err="1"/>
+              <a:t>ip</a:t>
+            </a:r>
+            <a:r>
+              <a:rPr lang="en-US" sz="1400" dirty="0"/>
+              <a:t> route add 224.0.0.0/4 </a:t>
+            </a:r>
+            <a:r>
+              <a:rPr lang="en-US" sz="1400" dirty="0" err="1"/>
+              <a:t>dev</a:t>
+            </a:r>
+            <a:r>
+              <a:rPr lang="en-US" sz="1400" dirty="0"/>
+              <a:t> eth0</a:t>
+            </a:r>
+          </a:p>
+          <a:p>
+            <a:r>
+              <a:rPr lang="en-US" sz="1400" dirty="0"/>
+              <a:t># or: </a:t>
+            </a:r>
+            <a:r>
+              <a:rPr lang="en-US" sz="1400" dirty="0" err="1"/>
+              <a:t>sudo</a:t>
+            </a:r>
+            <a:r>
+              <a:rPr lang="en-US" sz="1400" dirty="0"/>
+              <a:t> route add -net 224.0.0.0/4 </a:t>
+            </a:r>
+            <a:r>
+              <a:rPr lang="en-US" sz="1400" dirty="0" err="1"/>
+              <a:t>dev</a:t>
+            </a:r>
+            <a:r>
+              <a:rPr lang="en-US" sz="1400" dirty="0"/>
+              <a:t> eth0</a:t>
+            </a:r>
+          </a:p>
+          <a:p>
+            <a:endParaRPr lang="en-US" sz="1400" dirty="0"/>
+          </a:p>
+          <a:p>
+            <a:r>
+              <a:rPr lang="en-US" sz="1400" b="1" dirty="0"/>
+              <a:t># Show routing table</a:t>
+            </a:r>
+          </a:p>
+          <a:p>
+            <a:r>
+              <a:rPr lang="en-US" sz="1400" dirty="0" err="1"/>
+              <a:t>netstat</a:t>
+            </a:r>
+            <a:r>
+              <a:rPr lang="en-US" sz="1400" dirty="0"/>
+              <a:t> -</a:t>
+            </a:r>
+            <a:r>
+              <a:rPr lang="en-US" sz="1400" dirty="0" err="1"/>
+              <a:t>rn</a:t>
+            </a:r>
+            <a:endParaRPr lang="en-US" sz="1400" dirty="0"/>
+          </a:p>
+        </p:txBody>
+      </p:sp>
+      <p:pic>
+        <p:nvPicPr>
+          <p:cNvPr id="8" name="Picture 7"/>
+          <p:cNvPicPr>
+            <a:picLocks noChangeAspect="1"/>
+          </p:cNvPicPr>
+          <p:nvPr/>
+        </p:nvPicPr>
+        <p:blipFill>
+          <a:blip r:embed="rId3"/>
+          <a:stretch>
+            <a:fillRect/>
+          </a:stretch>
+        </p:blipFill>
+        <p:spPr>
+          <a:xfrm>
+            <a:off x="591910" y="3128962"/>
+            <a:ext cx="6153150" cy="1057275"/>
+          </a:xfrm>
+          <a:prstGeom prst="rect">
+            <a:avLst/>
+          </a:prstGeom>
+        </p:spPr>
+      </p:pic>
+      <p:sp>
+        <p:nvSpPr>
+          <p:cNvPr id="10" name="TextBox 9"/>
+          <p:cNvSpPr txBox="1"/>
+          <p:nvPr/>
+        </p:nvSpPr>
+        <p:spPr>
+          <a:xfrm>
+            <a:off x="591910" y="4501643"/>
+            <a:ext cx="5824608" cy="1169551"/>
+          </a:xfrm>
+          <a:prstGeom prst="rect">
+            <a:avLst/>
+          </a:prstGeom>
+          <a:solidFill>
+            <a:schemeClr val="bg1">
+              <a:lumMod val="95000"/>
+            </a:schemeClr>
+          </a:solidFill>
+        </p:spPr>
+        <p:txBody>
+          <a:bodyPr wrap="none" rtlCol="0">
+            <a:spAutoFit/>
+          </a:bodyPr>
+          <a:lstStyle/>
+          <a:p>
+            <a:r>
+              <a:rPr lang="en-US" sz="1400" dirty="0"/>
+              <a:t># Sender</a:t>
+            </a:r>
+          </a:p>
+          <a:p>
+            <a:r>
+              <a:rPr lang="en-US" sz="1400" dirty="0"/>
+              <a:t>echo "Hello multicast" | </a:t>
+            </a:r>
+            <a:r>
+              <a:rPr lang="en-US" sz="1400" dirty="0" err="1"/>
+              <a:t>socat</a:t>
+            </a:r>
+            <a:r>
+              <a:rPr lang="en-US" sz="1400" dirty="0"/>
+              <a:t> - UDP4-DATAGRAM:239.0.0.1:12345</a:t>
+            </a:r>
+          </a:p>
+          <a:p>
+            <a:endParaRPr lang="en-US" sz="1400" dirty="0"/>
+          </a:p>
+          <a:p>
+            <a:r>
+              <a:rPr lang="en-US" sz="1400" dirty="0"/>
+              <a:t># Receiver</a:t>
+            </a:r>
+          </a:p>
+          <a:p>
+            <a:r>
+              <a:rPr lang="en-US" sz="1400" dirty="0" err="1"/>
+              <a:t>socat</a:t>
+            </a:r>
+            <a:r>
+              <a:rPr lang="en-US" sz="1400" dirty="0"/>
+              <a:t> -v UDP4-RECVFROM:12345,ip-add-membership=239.0.0.1:0.0.0.0,fork -</a:t>
+            </a:r>
+          </a:p>
+        </p:txBody>
+      </p:sp>
+      <p:pic>
+        <p:nvPicPr>
+          <p:cNvPr id="11" name="Picture 10"/>
+          <p:cNvPicPr>
+            <a:picLocks noChangeAspect="1"/>
+          </p:cNvPicPr>
+          <p:nvPr/>
+        </p:nvPicPr>
+        <p:blipFill>
+          <a:blip r:embed="rId4"/>
+          <a:stretch>
+            <a:fillRect/>
+          </a:stretch>
+        </p:blipFill>
+        <p:spPr>
+          <a:xfrm>
+            <a:off x="527957" y="5813916"/>
+            <a:ext cx="8675828" cy="615931"/>
+          </a:xfrm>
+          <a:prstGeom prst="rect">
+            <a:avLst/>
+          </a:prstGeom>
+        </p:spPr>
+      </p:pic>
+    </p:spTree>
+    <p:extLst>
+      <p:ext uri="{BB962C8B-B14F-4D97-AF65-F5344CB8AC3E}">
+        <p14:creationId xmlns:p14="http://schemas.microsoft.com/office/powerpoint/2010/main" val="4092934171"/>
+      </p:ext>
+    </p:extLst>
+  </p:cSld>
+  <p:clrMapOvr>
+    <a:masterClrMapping/>
+  </p:clrMapOvr>
+  <p:timing>
+    <p:tnLst>
+      <p:par>
+        <p:cTn id="1" dur="indefinite" restart="never" nodeType="tmRoot"/>
+      </p:par>
+    </p:tnLst>
+  </p:timing>
+</p:sld>
+</file>
+
+<file path=ppt/slides/slide25.xml><?xml version="1.0" encoding="utf-8"?>
+<p:sld xmlns:a="http://schemas.openxmlformats.org/drawingml/2006/main" xmlns:r="http://schemas.openxmlformats.org/officeDocument/2006/relationships" xmlns:p="http://schemas.openxmlformats.org/presentationml/2006/main">
+  <p:cSld>
+    <p:spTree>
+      <p:nvGrpSpPr>
+        <p:cNvPr id="1" name=""/>
+        <p:cNvGrpSpPr/>
+        <p:nvPr/>
+      </p:nvGrpSpPr>
+      <p:grpSpPr>
+        <a:xfrm>
+          <a:off x="0" y="0"/>
+          <a:ext cx="0" cy="0"/>
+          <a:chOff x="0" y="0"/>
+          <a:chExt cx="0" cy="0"/>
+        </a:xfrm>
+      </p:grpSpPr>
+      <p:sp>
+        <p:nvSpPr>
+          <p:cNvPr id="3" name="Content Placeholder 2"/>
+          <p:cNvSpPr>
+            <a:spLocks noGrp="1"/>
+          </p:cNvSpPr>
+          <p:nvPr>
+            <p:ph idx="1"/>
+          </p:nvPr>
+        </p:nvSpPr>
+        <p:spPr>
+          <a:xfrm>
+            <a:off x="347330" y="467833"/>
+            <a:ext cx="8168020" cy="5709130"/>
+          </a:xfrm>
+        </p:spPr>
+        <p:txBody>
+          <a:bodyPr/>
+          <a:lstStyle/>
+          <a:p>
+            <a:pPr marL="0" indent="0">
+              <a:buNone/>
+            </a:pPr>
+            <a:r>
+              <a:rPr lang="en-US" sz="2400" b="1" dirty="0"/>
+              <a:t>4</a:t>
+            </a:r>
+            <a:r>
+              <a:rPr lang="en-US" sz="2400" b="1" dirty="0" smtClean="0"/>
+              <a:t>. Demo </a:t>
+            </a:r>
+            <a:r>
+              <a:rPr lang="en-US" sz="1400" dirty="0"/>
+              <a:t>(https://github.com/minhthedt/vsomeip-example)</a:t>
+            </a:r>
+            <a:endParaRPr lang="en-US" sz="1400" b="1" dirty="0" smtClean="0"/>
+          </a:p>
+        </p:txBody>
+      </p:sp>
+      <p:sp>
+        <p:nvSpPr>
+          <p:cNvPr id="9" name="Slide Number Placeholder 8"/>
+          <p:cNvSpPr>
+            <a:spLocks noGrp="1"/>
+          </p:cNvSpPr>
+          <p:nvPr>
+            <p:ph type="sldNum" sz="quarter" idx="12"/>
+          </p:nvPr>
+        </p:nvSpPr>
+        <p:spPr>
+          <a:xfrm>
+            <a:off x="8744270" y="6492875"/>
+            <a:ext cx="2057400" cy="365125"/>
+          </a:xfrm>
+        </p:spPr>
+        <p:txBody>
+          <a:bodyPr/>
+          <a:lstStyle/>
+          <a:p>
+            <a:fld id="{96C55251-E90D-44CC-8B75-53FCEE02E655}" type="slidenum">
+              <a:rPr lang="en-US" smtClean="0">
+                <a:solidFill>
+                  <a:schemeClr val="bg1">
+                    <a:lumMod val="50000"/>
+                  </a:schemeClr>
+                </a:solidFill>
+              </a:rPr>
+              <a:t>25</a:t>
+            </a:fld>
+            <a:endParaRPr lang="en-US" dirty="0">
+              <a:solidFill>
+                <a:schemeClr val="bg1">
+                  <a:lumMod val="50000"/>
+                </a:schemeClr>
+              </a:solidFill>
+            </a:endParaRPr>
+          </a:p>
+        </p:txBody>
+      </p:sp>
+      <p:sp>
+        <p:nvSpPr>
+          <p:cNvPr id="2" name="TextBox 1"/>
+          <p:cNvSpPr txBox="1"/>
+          <p:nvPr/>
+        </p:nvSpPr>
+        <p:spPr>
+          <a:xfrm>
+            <a:off x="527957" y="922173"/>
+            <a:ext cx="1372427" cy="369332"/>
+          </a:xfrm>
+          <a:prstGeom prst="rect">
+            <a:avLst/>
+          </a:prstGeom>
+          <a:noFill/>
+        </p:spPr>
+        <p:txBody>
+          <a:bodyPr wrap="none" rtlCol="0">
+            <a:spAutoFit/>
+          </a:bodyPr>
+          <a:lstStyle/>
+          <a:p>
+            <a:pPr marL="285750" indent="-285750">
+              <a:buFont typeface="Wingdings" panose="05000000000000000000" pitchFamily="2" charset="2"/>
+              <a:buChar char="Ø"/>
+            </a:pPr>
+            <a:r>
+              <a:rPr lang="en-US" b="1" dirty="0"/>
+              <a:t>Run Tests</a:t>
+            </a:r>
+          </a:p>
+        </p:txBody>
+      </p:sp>
+      <p:graphicFrame>
+        <p:nvGraphicFramePr>
+          <p:cNvPr id="13" name="Table 12"/>
+          <p:cNvGraphicFramePr>
+            <a:graphicFrameLocks noGrp="1"/>
+          </p:cNvGraphicFramePr>
+          <p:nvPr>
+            <p:extLst>
+              <p:ext uri="{D42A27DB-BD31-4B8C-83A1-F6EECF244321}">
+                <p14:modId xmlns:p14="http://schemas.microsoft.com/office/powerpoint/2010/main" val="2324215230"/>
+              </p:ext>
+            </p:extLst>
+          </p:nvPr>
+        </p:nvGraphicFramePr>
+        <p:xfrm>
+          <a:off x="527956" y="1397000"/>
+          <a:ext cx="7987394" cy="1859280"/>
+        </p:xfrm>
+        <a:graphic>
+          <a:graphicData uri="http://schemas.openxmlformats.org/drawingml/2006/table">
+            <a:tbl>
+              <a:tblPr firstRow="1" bandRow="1">
+                <a:tableStyleId>{5C22544A-7EE6-4342-B048-85BDC9FD1C3A}</a:tableStyleId>
+              </a:tblPr>
+              <a:tblGrid>
+                <a:gridCol w="3880914"/>
+                <a:gridCol w="4106480"/>
+              </a:tblGrid>
+              <a:tr h="351136">
+                <a:tc>
+                  <a:txBody>
+                    <a:bodyPr/>
+                    <a:lstStyle/>
+                    <a:p>
+                      <a:pPr marL="0" marR="0" indent="0" algn="l" defTabSz="914400" rtl="0" eaLnBrk="1" fontAlgn="auto" latinLnBrk="0" hangingPunct="1">
+                        <a:lnSpc>
+                          <a:spcPct val="100000"/>
+                        </a:lnSpc>
+                        <a:spcBef>
+                          <a:spcPts val="0"/>
+                        </a:spcBef>
+                        <a:spcAft>
+                          <a:spcPts val="0"/>
+                        </a:spcAft>
+                        <a:buClrTx/>
+                        <a:buSzTx/>
+                        <a:buFontTx/>
+                        <a:buNone/>
+                        <a:tabLst/>
+                        <a:defRPr/>
+                      </a:pPr>
+                      <a:r>
+                        <a:rPr lang="en-US" dirty="0" smtClean="0"/>
+                        <a:t>PC1 (</a:t>
+                      </a:r>
+                      <a:r>
+                        <a:rPr lang="en-US" sz="1800" b="0" kern="1200" dirty="0" smtClean="0">
+                          <a:solidFill>
+                            <a:schemeClr val="lt1"/>
+                          </a:solidFill>
+                          <a:effectLst/>
+                          <a:latin typeface="+mn-lt"/>
+                          <a:ea typeface="+mn-ea"/>
+                          <a:cs typeface="+mn-cs"/>
+                        </a:rPr>
+                        <a:t>172.17.0.6</a:t>
+                      </a:r>
+                      <a:r>
+                        <a:rPr lang="en-US" dirty="0" smtClean="0"/>
+                        <a:t>)</a:t>
+                      </a:r>
+                      <a:endParaRPr lang="en-US" dirty="0"/>
+                    </a:p>
+                  </a:txBody>
+                  <a:tcPr/>
+                </a:tc>
+                <a:tc>
+                  <a:txBody>
+                    <a:bodyPr/>
+                    <a:lstStyle/>
+                    <a:p>
+                      <a:r>
+                        <a:rPr lang="en-US" dirty="0" smtClean="0"/>
+                        <a:t>PC2</a:t>
+                      </a:r>
+                      <a:r>
+                        <a:rPr lang="en-US" dirty="0" smtClean="0"/>
+                        <a:t>(</a:t>
+                      </a:r>
+                      <a:r>
+                        <a:rPr lang="en-US" sz="1800" b="0" kern="1200" dirty="0" smtClean="0">
+                          <a:solidFill>
+                            <a:schemeClr val="lt1"/>
+                          </a:solidFill>
+                          <a:effectLst/>
+                          <a:latin typeface="+mn-lt"/>
+                          <a:ea typeface="+mn-ea"/>
+                          <a:cs typeface="+mn-cs"/>
+                        </a:rPr>
+                        <a:t>172.17.0.5</a:t>
+                      </a:r>
+                      <a:r>
+                        <a:rPr lang="en-US" dirty="0" smtClean="0"/>
+                        <a:t>)</a:t>
+                      </a:r>
+                      <a:endParaRPr lang="en-US" dirty="0"/>
+                    </a:p>
+                  </a:txBody>
+                  <a:tcPr/>
+                </a:tc>
+              </a:tr>
+              <a:tr h="548349">
+                <a:tc>
+                  <a:txBody>
+                    <a:bodyPr/>
+                    <a:lstStyle/>
+                    <a:p>
+                      <a:r>
+                        <a:rPr lang="en-US" sz="1400" b="1" i="0" kern="1200" dirty="0" smtClean="0">
+                          <a:solidFill>
+                            <a:schemeClr val="dk1"/>
+                          </a:solidFill>
+                          <a:effectLst/>
+                          <a:latin typeface="+mn-lt"/>
+                          <a:ea typeface="+mn-ea"/>
+                          <a:cs typeface="+mn-cs"/>
+                        </a:rPr>
+                        <a:t>Set correct IP addresses to </a:t>
+                      </a:r>
+                      <a:r>
+                        <a:rPr lang="en-US" sz="1400" b="1" i="0" kern="1200" dirty="0" err="1" smtClean="0">
+                          <a:solidFill>
+                            <a:schemeClr val="dk1"/>
+                          </a:solidFill>
+                          <a:effectLst/>
+                          <a:latin typeface="+mn-lt"/>
+                          <a:ea typeface="+mn-ea"/>
+                          <a:cs typeface="+mn-cs"/>
+                        </a:rPr>
+                        <a:t>HelloWorldClient.json</a:t>
+                      </a:r>
+                      <a:endParaRPr lang="en-US" sz="1400" dirty="0"/>
+                    </a:p>
+                  </a:txBody>
+                  <a:tcPr/>
+                </a:tc>
+                <a:tc>
+                  <a:txBody>
+                    <a:bodyPr/>
+                    <a:lstStyle/>
+                    <a:p>
+                      <a:pPr marL="0" marR="0" indent="0" algn="l" defTabSz="914400" rtl="0" eaLnBrk="1" fontAlgn="auto" latinLnBrk="0" hangingPunct="1">
+                        <a:lnSpc>
+                          <a:spcPct val="100000"/>
+                        </a:lnSpc>
+                        <a:spcBef>
+                          <a:spcPts val="0"/>
+                        </a:spcBef>
+                        <a:spcAft>
+                          <a:spcPts val="0"/>
+                        </a:spcAft>
+                        <a:buClrTx/>
+                        <a:buSzTx/>
+                        <a:buFontTx/>
+                        <a:buNone/>
+                        <a:tabLst/>
+                        <a:defRPr/>
+                      </a:pPr>
+                      <a:r>
+                        <a:rPr lang="en-US" sz="1400" b="1" i="0" kern="1200" dirty="0" smtClean="0">
+                          <a:solidFill>
+                            <a:schemeClr val="dk1"/>
+                          </a:solidFill>
+                          <a:effectLst/>
+                          <a:latin typeface="+mn-lt"/>
+                          <a:ea typeface="+mn-ea"/>
+                          <a:cs typeface="+mn-cs"/>
+                        </a:rPr>
+                        <a:t>Set correct IP addresses to </a:t>
+                      </a:r>
+                      <a:r>
+                        <a:rPr lang="en-US" sz="1400" b="1" i="0" kern="1200" dirty="0" err="1" smtClean="0">
+                          <a:solidFill>
+                            <a:schemeClr val="dk1"/>
+                          </a:solidFill>
+                          <a:effectLst/>
+                          <a:latin typeface="+mn-lt"/>
+                          <a:ea typeface="+mn-ea"/>
+                          <a:cs typeface="+mn-cs"/>
+                        </a:rPr>
+                        <a:t>HelloWorldService.json</a:t>
+                      </a:r>
+                      <a:endParaRPr lang="en-US" sz="1400" dirty="0" smtClean="0"/>
+                    </a:p>
+                    <a:p>
+                      <a:endParaRPr lang="en-US" dirty="0"/>
+                    </a:p>
+                  </a:txBody>
+                  <a:tcPr/>
+                </a:tc>
+              </a:tr>
+              <a:tr h="865815">
+                <a:tc>
+                  <a:txBody>
+                    <a:bodyPr/>
+                    <a:lstStyle/>
+                    <a:p>
+                      <a:r>
+                        <a:rPr lang="en-US" dirty="0" smtClean="0"/>
+                        <a:t>cd </a:t>
+                      </a:r>
+                      <a:r>
+                        <a:rPr lang="en-US" dirty="0" err="1" smtClean="0"/>
+                        <a:t>vsomeip</a:t>
+                      </a:r>
+                      <a:r>
+                        <a:rPr lang="en-US" dirty="0" smtClean="0"/>
+                        <a:t>-example</a:t>
+                      </a:r>
+                    </a:p>
+                    <a:p>
+                      <a:r>
+                        <a:rPr lang="en-US" dirty="0" err="1" smtClean="0"/>
+                        <a:t>sudo</a:t>
+                      </a:r>
+                      <a:r>
+                        <a:rPr lang="en-US" dirty="0" smtClean="0"/>
+                        <a:t> ./bin/run_HelloWorldClient.sh</a:t>
+                      </a:r>
+                    </a:p>
+                    <a:p>
+                      <a:endParaRPr lang="en-US" dirty="0"/>
+                    </a:p>
+                  </a:txBody>
+                  <a:tcPr/>
+                </a:tc>
+                <a:tc>
+                  <a:txBody>
+                    <a:bodyPr/>
+                    <a:lstStyle/>
+                    <a:p>
+                      <a:r>
+                        <a:rPr lang="en-US" dirty="0" smtClean="0"/>
+                        <a:t>cd </a:t>
+                      </a:r>
+                      <a:r>
+                        <a:rPr lang="en-US" dirty="0" err="1" smtClean="0"/>
+                        <a:t>vsomeip</a:t>
+                      </a:r>
+                      <a:r>
+                        <a:rPr lang="en-US" dirty="0" smtClean="0"/>
+                        <a:t>-example</a:t>
+                      </a:r>
+                    </a:p>
+                    <a:p>
+                      <a:r>
+                        <a:rPr lang="en-US" dirty="0" err="1" smtClean="0"/>
+                        <a:t>sudo</a:t>
+                      </a:r>
+                      <a:r>
+                        <a:rPr lang="en-US" dirty="0" smtClean="0"/>
+                        <a:t> ./bin/run_HelloWorldService.sh</a:t>
+                      </a:r>
+                    </a:p>
+                  </a:txBody>
+                  <a:tcPr/>
+                </a:tc>
+              </a:tr>
+            </a:tbl>
+          </a:graphicData>
+        </a:graphic>
+      </p:graphicFrame>
+      <p:pic>
+        <p:nvPicPr>
+          <p:cNvPr id="14" name="Picture 13"/>
+          <p:cNvPicPr>
+            <a:picLocks noChangeAspect="1"/>
+          </p:cNvPicPr>
+          <p:nvPr/>
+        </p:nvPicPr>
+        <p:blipFill>
+          <a:blip r:embed="rId3"/>
+          <a:stretch>
+            <a:fillRect/>
+          </a:stretch>
+        </p:blipFill>
+        <p:spPr>
+          <a:xfrm>
+            <a:off x="527957" y="5160962"/>
+            <a:ext cx="5353050" cy="1514475"/>
+          </a:xfrm>
+          <a:prstGeom prst="rect">
+            <a:avLst/>
+          </a:prstGeom>
+        </p:spPr>
+      </p:pic>
+      <p:sp>
+        <p:nvSpPr>
+          <p:cNvPr id="15" name="TextBox 14"/>
+          <p:cNvSpPr txBox="1"/>
+          <p:nvPr/>
+        </p:nvSpPr>
+        <p:spPr>
+          <a:xfrm>
+            <a:off x="516672" y="3412671"/>
+            <a:ext cx="1383712" cy="369332"/>
+          </a:xfrm>
+          <a:prstGeom prst="rect">
+            <a:avLst/>
+          </a:prstGeom>
+          <a:noFill/>
+        </p:spPr>
+        <p:txBody>
+          <a:bodyPr wrap="none" rtlCol="0">
+            <a:spAutoFit/>
+          </a:bodyPr>
+          <a:lstStyle/>
+          <a:p>
+            <a:r>
+              <a:rPr lang="en-US" dirty="0" smtClean="0"/>
+              <a:t>Console log: </a:t>
+            </a:r>
+            <a:endParaRPr lang="en-US" dirty="0"/>
+          </a:p>
+        </p:txBody>
+      </p:sp>
+      <p:sp>
+        <p:nvSpPr>
+          <p:cNvPr id="17" name="TextBox 16"/>
+          <p:cNvSpPr txBox="1"/>
+          <p:nvPr/>
+        </p:nvSpPr>
+        <p:spPr>
+          <a:xfrm>
+            <a:off x="527957" y="3917484"/>
+            <a:ext cx="919547" cy="369332"/>
+          </a:xfrm>
+          <a:prstGeom prst="rect">
+            <a:avLst/>
+          </a:prstGeom>
+          <a:noFill/>
+        </p:spPr>
+        <p:txBody>
+          <a:bodyPr wrap="none" rtlCol="0">
+            <a:spAutoFit/>
+          </a:bodyPr>
+          <a:lstStyle/>
+          <a:p>
+            <a:r>
+              <a:rPr lang="en-US" dirty="0" smtClean="0"/>
+              <a:t>DLT log:</a:t>
+            </a:r>
+            <a:endParaRPr lang="en-US" dirty="0"/>
+          </a:p>
+        </p:txBody>
+      </p:sp>
+      <p:sp>
+        <p:nvSpPr>
+          <p:cNvPr id="18" name="TextBox 17"/>
+          <p:cNvSpPr txBox="1"/>
+          <p:nvPr/>
+        </p:nvSpPr>
+        <p:spPr>
+          <a:xfrm>
+            <a:off x="566057" y="4677580"/>
+            <a:ext cx="963341" cy="369332"/>
+          </a:xfrm>
+          <a:prstGeom prst="rect">
+            <a:avLst/>
+          </a:prstGeom>
+          <a:noFill/>
+        </p:spPr>
+        <p:txBody>
+          <a:bodyPr wrap="none" rtlCol="0">
+            <a:spAutoFit/>
+          </a:bodyPr>
+          <a:lstStyle/>
+          <a:p>
+            <a:r>
+              <a:rPr lang="en-US" dirty="0" err="1" smtClean="0"/>
+              <a:t>Pcap</a:t>
+            </a:r>
+            <a:r>
+              <a:rPr lang="en-US" dirty="0" smtClean="0"/>
+              <a:t> log</a:t>
+            </a:r>
+            <a:endParaRPr lang="en-US" dirty="0"/>
+          </a:p>
+        </p:txBody>
+      </p:sp>
+    </p:spTree>
+    <p:extLst>
+      <p:ext uri="{BB962C8B-B14F-4D97-AF65-F5344CB8AC3E}">
+        <p14:creationId xmlns:p14="http://schemas.microsoft.com/office/powerpoint/2010/main" val="1478246796"/>
       </p:ext>
     </p:extLst>
   </p:cSld>

</xml_diff>